<commit_message>
Modification presentation, correction des commentaires, ajout dans la vu vote la gestion du singulier et pluriel
</commit_message>
<xml_diff>
--- a/DossierPresentation/Présentation.pptx
+++ b/DossierPresentation/Présentation.pptx
@@ -222,7 +222,7 @@
           <a:p>
             <a:fld id="{D8D6469D-CF2E-4753-807F-FBDEC5526CB0}" type="datetimeFigureOut">
               <a:rPr lang="fr-FR" smtClean="0"/>
-              <a:t>31/01/2018</a:t>
+              <a:t>04/02/2018</a:t>
             </a:fld>
             <a:endParaRPr lang="fr-FR"/>
           </a:p>
@@ -980,7 +980,7 @@
           <a:p>
             <a:fld id="{78ABE3C1-DBE1-495D-B57B-2849774B866A}" type="datetimeFigureOut">
               <a:rPr lang="en-US" dirty="0"/>
-              <a:t>1/31/2018</a:t>
+              <a:t>2/4/2018</a:t>
             </a:fld>
             <a:endParaRPr lang="en-US" dirty="0"/>
           </a:p>
@@ -1389,7 +1389,7 @@
           <a:p>
             <a:fld id="{446C117F-5CCF-4837-BE5F-2B92066CAFAF}" type="datetimeFigureOut">
               <a:rPr lang="en-US" dirty="0"/>
-              <a:t>1/31/2018</a:t>
+              <a:t>2/4/2018</a:t>
             </a:fld>
             <a:endParaRPr lang="en-US" dirty="0"/>
           </a:p>
@@ -1720,7 +1720,7 @@
           <a:p>
             <a:fld id="{84EB90BD-B6CE-46B7-997F-7313B992CCDC}" type="datetimeFigureOut">
               <a:rPr lang="en-US" dirty="0"/>
-              <a:t>1/31/2018</a:t>
+              <a:t>2/4/2018</a:t>
             </a:fld>
             <a:endParaRPr lang="en-US" dirty="0"/>
           </a:p>
@@ -2120,7 +2120,7 @@
           <a:p>
             <a:fld id="{CDB9D11F-B188-461D-B23F-39381795C052}" type="datetimeFigureOut">
               <a:rPr lang="en-US" dirty="0"/>
-              <a:t>1/31/2018</a:t>
+              <a:t>2/4/2018</a:t>
             </a:fld>
             <a:endParaRPr lang="en-US" dirty="0"/>
           </a:p>
@@ -2683,7 +2683,7 @@
           <a:p>
             <a:fld id="{52E6D8D9-55A2-4063-B0F3-121F44549695}" type="datetimeFigureOut">
               <a:rPr lang="en-US" dirty="0"/>
-              <a:t>1/31/2018</a:t>
+              <a:t>2/4/2018</a:t>
             </a:fld>
             <a:endParaRPr lang="en-US" dirty="0"/>
           </a:p>
@@ -3359,7 +3359,7 @@
           <a:p>
             <a:fld id="{D4B24536-994D-4021-A283-9F449C0DB509}" type="datetimeFigureOut">
               <a:rPr lang="en-US" dirty="0"/>
-              <a:t>1/31/2018</a:t>
+              <a:t>2/4/2018</a:t>
             </a:fld>
             <a:endParaRPr lang="en-US" dirty="0"/>
           </a:p>
@@ -4267,7 +4267,7 @@
           <a:p>
             <a:fld id="{3CBBBB78-C96F-47B7-AB17-D852CA960AC9}" type="datetimeFigureOut">
               <a:rPr lang="en-US" dirty="0"/>
-              <a:t>1/31/2018</a:t>
+              <a:t>2/4/2018</a:t>
             </a:fld>
             <a:endParaRPr lang="en-US" dirty="0"/>
           </a:p>
@@ -4575,7 +4575,7 @@
           <a:p>
             <a:fld id="{1FA3F48C-C7C6-4055-9F49-3777875E72AE}" type="datetimeFigureOut">
               <a:rPr lang="en-US" dirty="0"/>
-              <a:t>1/31/2018</a:t>
+              <a:t>2/4/2018</a:t>
             </a:fld>
             <a:endParaRPr lang="en-US" dirty="0"/>
           </a:p>
@@ -4834,7 +4834,7 @@
           <a:p>
             <a:fld id="{6178E61D-D431-422C-9764-11DAFE33AB63}" type="datetimeFigureOut">
               <a:rPr lang="en-US" dirty="0"/>
-              <a:t>1/31/2018</a:t>
+              <a:t>2/4/2018</a:t>
             </a:fld>
             <a:endParaRPr lang="en-US" dirty="0"/>
           </a:p>
@@ -5153,7 +5153,7 @@
           <a:p>
             <a:fld id="{12DE42F4-6EEF-4EF7-8ED4-2208F0F89A08}" type="datetimeFigureOut">
               <a:rPr lang="en-US" dirty="0"/>
-              <a:t>1/31/2018</a:t>
+              <a:t>2/4/2018</a:t>
             </a:fld>
             <a:endParaRPr lang="en-US" dirty="0"/>
           </a:p>
@@ -5537,7 +5537,7 @@
           <a:p>
             <a:fld id="{30578ACC-22D6-47C1-A373-4FD133E34F3C}" type="datetimeFigureOut">
               <a:rPr lang="en-US" dirty="0"/>
-              <a:t>1/31/2018</a:t>
+              <a:t>2/4/2018</a:t>
             </a:fld>
             <a:endParaRPr lang="en-US" dirty="0"/>
           </a:p>
@@ -5908,7 +5908,7 @@
           <a:p>
             <a:fld id="{4E5A6C69-6797-4E8A-BF37-F2C3751466E9}" type="datetimeFigureOut">
               <a:rPr lang="en-US" dirty="0"/>
-              <a:t>1/31/2018</a:t>
+              <a:t>2/4/2018</a:t>
             </a:fld>
             <a:endParaRPr lang="en-US" dirty="0"/>
           </a:p>
@@ -6409,7 +6409,7 @@
           <a:p>
             <a:fld id="{D82014A1-A632-4878-A0D3-F52BA7563730}" type="datetimeFigureOut">
               <a:rPr lang="en-US" dirty="0"/>
-              <a:t>1/31/2018</a:t>
+              <a:t>2/4/2018</a:t>
             </a:fld>
             <a:endParaRPr lang="en-US" dirty="0"/>
           </a:p>
@@ -6661,7 +6661,7 @@
           <a:p>
             <a:fld id="{CE99F462-093F-4566-844B-4C71F2739DA5}" type="datetimeFigureOut">
               <a:rPr lang="en-US" dirty="0"/>
-              <a:t>1/31/2018</a:t>
+              <a:t>2/4/2018</a:t>
             </a:fld>
             <a:endParaRPr lang="en-US" dirty="0"/>
           </a:p>
@@ -6819,7 +6819,7 @@
           <a:p>
             <a:fld id="{3D24A7AC-904D-4781-85BA-7D10C17ED021}" type="datetimeFigureOut">
               <a:rPr lang="en-US" dirty="0"/>
-              <a:t>1/31/2018</a:t>
+              <a:t>2/4/2018</a:t>
             </a:fld>
             <a:endParaRPr lang="en-US" dirty="0"/>
           </a:p>
@@ -7204,7 +7204,7 @@
           <a:p>
             <a:fld id="{E331444B-B92B-4E27-8C94-BB93EAF5CB18}" type="datetimeFigureOut">
               <a:rPr lang="en-US" dirty="0"/>
-              <a:t>1/31/2018</a:t>
+              <a:t>2/4/2018</a:t>
             </a:fld>
             <a:endParaRPr lang="en-US" dirty="0"/>
           </a:p>
@@ -7608,7 +7608,7 @@
           <a:p>
             <a:fld id="{363EFA5E-FA76-400D-B3DC-F0BA90E6D107}" type="datetimeFigureOut">
               <a:rPr lang="en-US" dirty="0"/>
-              <a:t>1/31/2018</a:t>
+              <a:t>2/4/2018</a:t>
             </a:fld>
             <a:endParaRPr lang="en-US" dirty="0"/>
           </a:p>
@@ -7847,7 +7847,7 @@
           <a:p>
             <a:fld id="{9D6E9DEC-419B-4CC5-A080-3B06BD5A8291}" type="datetimeFigureOut">
               <a:rPr lang="en-US" dirty="0"/>
-              <a:t>1/31/2018</a:t>
+              <a:t>2/4/2018</a:t>
             </a:fld>
             <a:endParaRPr lang="en-US" dirty="0"/>
           </a:p>
@@ -9054,7 +9054,7 @@
           <a:p>
             <a:r>
               <a:rPr lang="fr-FR" dirty="0"/>
-              <a:t>Livraison : 05/02/2016</a:t>
+              <a:t>Livraison : 05/02/2018</a:t>
             </a:r>
           </a:p>
           <a:p>
@@ -10048,7 +10048,7 @@
           <a:p>
             <a:r>
               <a:rPr lang="fr-FR" dirty="0"/>
-              <a:t>http://IP:PORT/Resultat/VoteU/ID</a:t>
+              <a:t>http://IP:PORT/Home/Vote/ID</a:t>
             </a:r>
           </a:p>
         </p:txBody>

</xml_diff>